<commit_message>
repais CPF and RG verification, and delete Alert when a user is deleted
</commit_message>
<xml_diff>
--- a/src/main/resources/models/CertificateNR11.pptx
+++ b/src/main/resources/models/CertificateNR11.pptx
@@ -7765,7 +7765,19 @@
               <a:rPr lang="pt-BR" altLang="pt-BR" dirty="0" smtClean="0">
                 <a:latin typeface="Arial" panose="020B0604020202020204" pitchFamily="34" charset="0"/>
               </a:rPr>
-              <a:t>{{RG} </a:t>
+              <a:t>{{</a:t>
+            </a:r>
+            <a:r>
+              <a:rPr lang="pt-BR" altLang="pt-BR" smtClean="0">
+                <a:latin typeface="Arial" panose="020B0604020202020204" pitchFamily="34" charset="0"/>
+              </a:rPr>
+              <a:t>RG</a:t>
+            </a:r>
+            <a:r>
+              <a:rPr lang="pt-BR" altLang="pt-BR" smtClean="0">
+                <a:latin typeface="Arial" panose="020B0604020202020204" pitchFamily="34" charset="0"/>
+              </a:rPr>
+              <a:t>}} </a:t>
             </a:r>
             <a:r>
               <a:rPr lang="pt-BR" altLang="pt-BR" dirty="0">
@@ -7852,16 +7864,10 @@
               <a:rPr lang="pt-BR" altLang="pt-BR" sz="1400" dirty="0">
                 <a:latin typeface="Arial" panose="020B0604020202020204" pitchFamily="34" charset="0"/>
               </a:rPr>
-              <a:t>São Carlos</a:t>
-            </a:r>
-            <a:r>
-              <a:rPr lang="pt-BR" altLang="pt-BR" sz="1400">
-                <a:latin typeface="Arial" panose="020B0604020202020204" pitchFamily="34" charset="0"/>
-              </a:rPr>
-              <a:t>, </a:t>
-            </a:r>
-            <a:r>
-              <a:rPr lang="pt-BR" altLang="pt-BR" sz="1400" smtClean="0">
+              <a:t>São Carlos, </a:t>
+            </a:r>
+            <a:r>
+              <a:rPr lang="pt-BR" altLang="pt-BR" sz="1400" dirty="0" smtClean="0">
                 <a:latin typeface="Arial" panose="020B0604020202020204" pitchFamily="34" charset="0"/>
               </a:rPr>
               <a:t>{{DATA}}</a:t>

</xml_diff>